<commit_message>
disable script with no user input is complete
</commit_message>
<xml_diff>
--- a/jammingIcon.pptx
+++ b/jammingIcon.pptx
@@ -2982,6 +2982,42 @@
           <a:chExt cx="0" cy="0"/>
         </a:xfrm>
       </p:grpSpPr>
+      <p:pic>
+        <p:nvPicPr>
+          <p:cNvPr id="25" name="Picture 24" descr="A wifi symbol on a black background&#10;&#10;Description automatically generated">
+            <a:extLst>
+              <a:ext uri="{FF2B5EF4-FFF2-40B4-BE49-F238E27FC236}">
+                <a16:creationId xmlns:a16="http://schemas.microsoft.com/office/drawing/2014/main" id="{E0641AF2-9CA0-E483-4C72-4C1B65BC3CAA}"/>
+              </a:ext>
+            </a:extLst>
+          </p:cNvPr>
+          <p:cNvPicPr>
+            <a:picLocks noChangeAspect="1"/>
+          </p:cNvPicPr>
+          <p:nvPr/>
+        </p:nvPicPr>
+        <p:blipFill>
+          <a:blip r:embed="rId2">
+            <a:extLst>
+              <a:ext uri="{28A0092B-C50C-407E-A947-70E740481C1C}">
+                <a14:useLocalDpi xmlns:a14="http://schemas.microsoft.com/office/drawing/2010/main" val="0"/>
+              </a:ext>
+            </a:extLst>
+          </a:blip>
+          <a:stretch>
+            <a:fillRect/>
+          </a:stretch>
+        </p:blipFill>
+        <p:spPr>
+          <a:xfrm>
+            <a:off x="0" y="838200"/>
+            <a:ext cx="4635648" cy="3077554"/>
+          </a:xfrm>
+          <a:prstGeom prst="rect">
+            <a:avLst/>
+          </a:prstGeom>
+        </p:spPr>
+      </p:pic>
       <p:sp>
         <p:nvSpPr>
           <p:cNvPr id="20" name="Lightning Bolt 19">
@@ -2995,9 +3031,9 @@
           <p:nvPr/>
         </p:nvSpPr>
         <p:spPr>
-          <a:xfrm rot="3642312">
-            <a:off x="4082128" y="1023140"/>
-            <a:ext cx="3883086" cy="2202416"/>
+          <a:xfrm rot="2666790">
+            <a:off x="3303180" y="670304"/>
+            <a:ext cx="4594180" cy="4311355"/>
           </a:xfrm>
           <a:prstGeom prst="lightningBolt">
             <a:avLst/>
@@ -3036,42 +3072,6 @@
           </a:p>
         </p:txBody>
       </p:sp>
-      <p:pic>
-        <p:nvPicPr>
-          <p:cNvPr id="25" name="Picture 24" descr="A wifi symbol on a black background&#10;&#10;Description automatically generated">
-            <a:extLst>
-              <a:ext uri="{FF2B5EF4-FFF2-40B4-BE49-F238E27FC236}">
-                <a16:creationId xmlns:a16="http://schemas.microsoft.com/office/drawing/2014/main" id="{E0641AF2-9CA0-E483-4C72-4C1B65BC3CAA}"/>
-              </a:ext>
-            </a:extLst>
-          </p:cNvPr>
-          <p:cNvPicPr>
-            <a:picLocks noChangeAspect="1"/>
-          </p:cNvPicPr>
-          <p:nvPr/>
-        </p:nvPicPr>
-        <p:blipFill>
-          <a:blip r:embed="rId2">
-            <a:extLst>
-              <a:ext uri="{28A0092B-C50C-407E-A947-70E740481C1C}">
-                <a14:useLocalDpi xmlns:a14="http://schemas.microsoft.com/office/drawing/2010/main" val="0"/>
-              </a:ext>
-            </a:extLst>
-          </a:blip>
-          <a:stretch>
-            <a:fillRect/>
-          </a:stretch>
-        </p:blipFill>
-        <p:spPr>
-          <a:xfrm>
-            <a:off x="-1" y="0"/>
-            <a:ext cx="5302757" cy="3520440"/>
-          </a:xfrm>
-          <a:prstGeom prst="rect">
-            <a:avLst/>
-          </a:prstGeom>
-        </p:spPr>
-      </p:pic>
       <p:sp>
         <p:nvSpPr>
           <p:cNvPr id="26" name="TextBox 25">

</xml_diff>